<commit_message>
added slides for plasma globe stuff
</commit_message>
<xml_diff>
--- a/Präsentation.pptx
+++ b/Präsentation.pptx
@@ -15,6 +15,7 @@
     <p:sldId id="261" r:id="rId9"/>
     <p:sldId id="262" r:id="rId10"/>
     <p:sldId id="263" r:id="rId11"/>
+    <p:sldId id="266" r:id="rId12"/>
   </p:sldIdLst>
   <p:sldSz cx="12192000" cy="6858000"/>
   <p:notesSz cx="6858000" cy="9144000"/>
@@ -119,6 +120,18 @@
     </p:ext>
   </p:extLst>
 </p:presentation>
+</file>
+
+<file path=ppt/commentAuthors.xml><?xml version="1.0" encoding="utf-8"?>
+<p:cmAuthorLst xmlns:a="http://schemas.openxmlformats.org/drawingml/2006/main" xmlns:r="http://schemas.openxmlformats.org/officeDocument/2006/relationships" xmlns:p="http://schemas.openxmlformats.org/presentationml/2006/main">
+  <p:cmAuthor id="1" name="David" initials="D" lastIdx="1" clrIdx="0">
+    <p:extLst>
+      <p:ext uri="{19B8F6BF-5375-455C-9EA6-DF929625EA0E}">
+        <p15:presenceInfo xmlns:p15="http://schemas.microsoft.com/office/powerpoint/2012/main" userId="David" providerId="None"/>
+      </p:ext>
+    </p:extLst>
+  </p:cmAuthor>
+</p:cmAuthorLst>
 </file>
 
 <file path=ppt/slideLayouts/slideLayout1.xml><?xml version="1.0" encoding="utf-8"?>
@@ -3490,6 +3503,30 @@
               <a:rPr lang="de-DE" dirty="0" err="1"/>
               <a:t>Globes</a:t>
             </a:r>
+            <a:r>
+              <a:rPr lang="de-DE" dirty="0"/>
+              <a:t> – </a:t>
+            </a:r>
+            <a:r>
+              <a:rPr lang="de-DE" dirty="0" err="1"/>
+              <a:t>Sensing</a:t>
+            </a:r>
+            <a:r>
+              <a:rPr lang="de-DE" dirty="0"/>
+              <a:t> </a:t>
+            </a:r>
+            <a:r>
+              <a:rPr lang="de-DE" dirty="0" err="1"/>
+              <a:t>touch</a:t>
+            </a:r>
+            <a:r>
+              <a:rPr lang="de-DE" dirty="0"/>
+              <a:t> </a:t>
+            </a:r>
+            <a:r>
+              <a:rPr lang="de-DE" dirty="0" err="1"/>
+              <a:t>events</a:t>
+            </a:r>
             <a:endParaRPr lang="en-US" dirty="0"/>
           </a:p>
         </p:txBody>
@@ -3526,10 +3563,1141 @@
           </a:prstGeom>
         </p:spPr>
       </p:pic>
+      <p:pic>
+        <p:nvPicPr>
+          <p:cNvPr id="6" name="Grafik 5">
+            <a:extLst>
+              <a:ext uri="{FF2B5EF4-FFF2-40B4-BE49-F238E27FC236}">
+                <a16:creationId xmlns:a16="http://schemas.microsoft.com/office/drawing/2014/main" id="{B34A268E-6E70-47B0-9B41-0C64E4ADB3A4}"/>
+              </a:ext>
+            </a:extLst>
+          </p:cNvPr>
+          <p:cNvPicPr>
+            <a:picLocks noChangeAspect="1"/>
+          </p:cNvPicPr>
+          <p:nvPr/>
+        </p:nvPicPr>
+        <p:blipFill>
+          <a:blip r:embed="rId3"/>
+          <a:stretch>
+            <a:fillRect/>
+          </a:stretch>
+        </p:blipFill>
+        <p:spPr>
+          <a:xfrm>
+            <a:off x="4273826" y="1692118"/>
+            <a:ext cx="7300927" cy="4797752"/>
+          </a:xfrm>
+          <a:prstGeom prst="rect">
+            <a:avLst/>
+          </a:prstGeom>
+        </p:spPr>
+      </p:pic>
+      <p:sp>
+        <p:nvSpPr>
+          <p:cNvPr id="7" name="Textfeld 6">
+            <a:extLst>
+              <a:ext uri="{FF2B5EF4-FFF2-40B4-BE49-F238E27FC236}">
+                <a16:creationId xmlns:a16="http://schemas.microsoft.com/office/drawing/2014/main" id="{F33AB2CC-34F5-4046-AF22-D4053FAB713C}"/>
+              </a:ext>
+            </a:extLst>
+          </p:cNvPr>
+          <p:cNvSpPr txBox="1"/>
+          <p:nvPr/>
+        </p:nvSpPr>
+        <p:spPr>
+          <a:xfrm>
+            <a:off x="5496339" y="3140766"/>
+            <a:ext cx="1013791" cy="369332"/>
+          </a:xfrm>
+          <a:prstGeom prst="rect">
+            <a:avLst/>
+          </a:prstGeom>
+          <a:noFill/>
+        </p:spPr>
+        <p:txBody>
+          <a:bodyPr wrap="square" rtlCol="0">
+            <a:spAutoFit/>
+          </a:bodyPr>
+          <a:lstStyle/>
+          <a:p>
+            <a:r>
+              <a:rPr lang="de-DE" dirty="0" err="1"/>
+              <a:t>touched</a:t>
+            </a:r>
+            <a:endParaRPr lang="de-DE" dirty="0"/>
+          </a:p>
+        </p:txBody>
+      </p:sp>
+      <p:sp>
+        <p:nvSpPr>
+          <p:cNvPr id="8" name="Textfeld 7">
+            <a:extLst>
+              <a:ext uri="{FF2B5EF4-FFF2-40B4-BE49-F238E27FC236}">
+                <a16:creationId xmlns:a16="http://schemas.microsoft.com/office/drawing/2014/main" id="{E2CD9AC9-89E9-4E39-A53E-B5174315B0E2}"/>
+              </a:ext>
+            </a:extLst>
+          </p:cNvPr>
+          <p:cNvSpPr txBox="1"/>
+          <p:nvPr/>
+        </p:nvSpPr>
+        <p:spPr>
+          <a:xfrm>
+            <a:off x="7015713" y="3130828"/>
+            <a:ext cx="1013791" cy="369332"/>
+          </a:xfrm>
+          <a:prstGeom prst="rect">
+            <a:avLst/>
+          </a:prstGeom>
+          <a:noFill/>
+        </p:spPr>
+        <p:txBody>
+          <a:bodyPr wrap="square" rtlCol="0">
+            <a:spAutoFit/>
+          </a:bodyPr>
+          <a:lstStyle/>
+          <a:p>
+            <a:r>
+              <a:rPr lang="de-DE" dirty="0" err="1"/>
+              <a:t>touched</a:t>
+            </a:r>
+            <a:endParaRPr lang="de-DE" dirty="0"/>
+          </a:p>
+        </p:txBody>
+      </p:sp>
+      <p:sp>
+        <p:nvSpPr>
+          <p:cNvPr id="9" name="Textfeld 8">
+            <a:extLst>
+              <a:ext uri="{FF2B5EF4-FFF2-40B4-BE49-F238E27FC236}">
+                <a16:creationId xmlns:a16="http://schemas.microsoft.com/office/drawing/2014/main" id="{BFF2E9CB-904C-4DD2-9EA0-E9635C5E0100}"/>
+              </a:ext>
+            </a:extLst>
+          </p:cNvPr>
+          <p:cNvSpPr txBox="1"/>
+          <p:nvPr/>
+        </p:nvSpPr>
+        <p:spPr>
+          <a:xfrm>
+            <a:off x="8998226" y="2468218"/>
+            <a:ext cx="1013791" cy="369332"/>
+          </a:xfrm>
+          <a:prstGeom prst="rect">
+            <a:avLst/>
+          </a:prstGeom>
+          <a:noFill/>
+        </p:spPr>
+        <p:txBody>
+          <a:bodyPr wrap="square" rtlCol="0">
+            <a:spAutoFit/>
+          </a:bodyPr>
+          <a:lstStyle/>
+          <a:p>
+            <a:r>
+              <a:rPr lang="de-DE" dirty="0" err="1"/>
+              <a:t>touched</a:t>
+            </a:r>
+            <a:endParaRPr lang="de-DE" dirty="0"/>
+          </a:p>
+        </p:txBody>
+      </p:sp>
     </p:spTree>
     <p:extLst>
       <p:ext uri="{BB962C8B-B14F-4D97-AF65-F5344CB8AC3E}">
         <p14:creationId xmlns:p14="http://schemas.microsoft.com/office/powerpoint/2010/main" val="1316726018"/>
+      </p:ext>
+    </p:extLst>
+  </p:cSld>
+  <p:clrMapOvr>
+    <a:masterClrMapping/>
+  </p:clrMapOvr>
+</p:sld>
+</file>
+
+<file path=ppt/slides/slide11.xml><?xml version="1.0" encoding="utf-8"?>
+<p:sld xmlns:a="http://schemas.openxmlformats.org/drawingml/2006/main" xmlns:r="http://schemas.openxmlformats.org/officeDocument/2006/relationships" xmlns:p="http://schemas.openxmlformats.org/presentationml/2006/main">
+  <p:cSld>
+    <p:spTree>
+      <p:nvGrpSpPr>
+        <p:cNvPr id="1" name=""/>
+        <p:cNvGrpSpPr/>
+        <p:nvPr/>
+      </p:nvGrpSpPr>
+      <p:grpSpPr>
+        <a:xfrm>
+          <a:off x="0" y="0"/>
+          <a:ext cx="0" cy="0"/>
+          <a:chOff x="0" y="0"/>
+          <a:chExt cx="0" cy="0"/>
+        </a:xfrm>
+      </p:grpSpPr>
+      <p:sp>
+        <p:nvSpPr>
+          <p:cNvPr id="2" name="Titel 1">
+            <a:extLst>
+              <a:ext uri="{FF2B5EF4-FFF2-40B4-BE49-F238E27FC236}">
+                <a16:creationId xmlns:a16="http://schemas.microsoft.com/office/drawing/2014/main" id="{565C26DE-2FCD-451B-80BD-FA6A4AA00DC3}"/>
+              </a:ext>
+            </a:extLst>
+          </p:cNvPr>
+          <p:cNvSpPr>
+            <a:spLocks noGrp="1"/>
+          </p:cNvSpPr>
+          <p:nvPr>
+            <p:ph type="title"/>
+          </p:nvPr>
+        </p:nvSpPr>
+        <p:spPr/>
+        <p:txBody>
+          <a:bodyPr/>
+          <a:lstStyle/>
+          <a:p>
+            <a:r>
+              <a:rPr lang="de-DE" dirty="0"/>
+              <a:t>Plasma </a:t>
+            </a:r>
+            <a:r>
+              <a:rPr lang="de-DE" dirty="0" err="1"/>
+              <a:t>Globes</a:t>
+            </a:r>
+            <a:r>
+              <a:rPr lang="de-DE" dirty="0"/>
+              <a:t> - Puzzle</a:t>
+            </a:r>
+          </a:p>
+        </p:txBody>
+      </p:sp>
+      <p:pic>
+        <p:nvPicPr>
+          <p:cNvPr id="4" name="Inhaltsplatzhalter 3">
+            <a:extLst>
+              <a:ext uri="{FF2B5EF4-FFF2-40B4-BE49-F238E27FC236}">
+                <a16:creationId xmlns:a16="http://schemas.microsoft.com/office/drawing/2014/main" id="{DEDD317D-16E0-421A-B258-B30873925A3C}"/>
+              </a:ext>
+            </a:extLst>
+          </p:cNvPr>
+          <p:cNvPicPr>
+            <a:picLocks noChangeAspect="1"/>
+          </p:cNvPicPr>
+          <p:nvPr/>
+        </p:nvPicPr>
+        <p:blipFill>
+          <a:blip r:embed="rId2"/>
+          <a:stretch>
+            <a:fillRect/>
+          </a:stretch>
+        </p:blipFill>
+        <p:spPr>
+          <a:xfrm>
+            <a:off x="1474305" y="5128591"/>
+            <a:ext cx="1001273" cy="1257093"/>
+          </a:xfrm>
+          <a:prstGeom prst="rect">
+            <a:avLst/>
+          </a:prstGeom>
+        </p:spPr>
+      </p:pic>
+      <p:pic>
+        <p:nvPicPr>
+          <p:cNvPr id="5" name="Inhaltsplatzhalter 3">
+            <a:extLst>
+              <a:ext uri="{FF2B5EF4-FFF2-40B4-BE49-F238E27FC236}">
+                <a16:creationId xmlns:a16="http://schemas.microsoft.com/office/drawing/2014/main" id="{90546E51-A482-4D4D-A60F-3201D3484507}"/>
+              </a:ext>
+            </a:extLst>
+          </p:cNvPr>
+          <p:cNvPicPr>
+            <a:picLocks noChangeAspect="1"/>
+          </p:cNvPicPr>
+          <p:nvPr/>
+        </p:nvPicPr>
+        <p:blipFill>
+          <a:blip r:embed="rId2"/>
+          <a:stretch>
+            <a:fillRect/>
+          </a:stretch>
+        </p:blipFill>
+        <p:spPr>
+          <a:xfrm>
+            <a:off x="5623478" y="5148664"/>
+            <a:ext cx="1001273" cy="1257093"/>
+          </a:xfrm>
+          <a:prstGeom prst="rect">
+            <a:avLst/>
+          </a:prstGeom>
+        </p:spPr>
+      </p:pic>
+      <p:pic>
+        <p:nvPicPr>
+          <p:cNvPr id="6" name="Inhaltsplatzhalter 3">
+            <a:extLst>
+              <a:ext uri="{FF2B5EF4-FFF2-40B4-BE49-F238E27FC236}">
+                <a16:creationId xmlns:a16="http://schemas.microsoft.com/office/drawing/2014/main" id="{06C3299B-17B5-41A9-8546-7EA7BB515BBA}"/>
+              </a:ext>
+            </a:extLst>
+          </p:cNvPr>
+          <p:cNvPicPr>
+            <a:picLocks noChangeAspect="1"/>
+          </p:cNvPicPr>
+          <p:nvPr/>
+        </p:nvPicPr>
+        <p:blipFill>
+          <a:blip r:embed="rId2"/>
+          <a:stretch>
+            <a:fillRect/>
+          </a:stretch>
+        </p:blipFill>
+        <p:spPr>
+          <a:xfrm>
+            <a:off x="9716422" y="5128589"/>
+            <a:ext cx="1001273" cy="1257093"/>
+          </a:xfrm>
+          <a:prstGeom prst="rect">
+            <a:avLst/>
+          </a:prstGeom>
+        </p:spPr>
+      </p:pic>
+      <p:pic>
+        <p:nvPicPr>
+          <p:cNvPr id="7" name="Inhaltsplatzhalter 3">
+            <a:extLst>
+              <a:ext uri="{FF2B5EF4-FFF2-40B4-BE49-F238E27FC236}">
+                <a16:creationId xmlns:a16="http://schemas.microsoft.com/office/drawing/2014/main" id="{57015803-2C6F-458F-8FB9-3E89EFF844DD}"/>
+              </a:ext>
+            </a:extLst>
+          </p:cNvPr>
+          <p:cNvPicPr>
+            <a:picLocks noChangeAspect="1"/>
+          </p:cNvPicPr>
+          <p:nvPr/>
+        </p:nvPicPr>
+        <p:blipFill>
+          <a:blip r:embed="rId2"/>
+          <a:stretch>
+            <a:fillRect/>
+          </a:stretch>
+        </p:blipFill>
+        <p:spPr>
+          <a:xfrm>
+            <a:off x="5623479" y="3105403"/>
+            <a:ext cx="1001273" cy="1257093"/>
+          </a:xfrm>
+          <a:prstGeom prst="rect">
+            <a:avLst/>
+          </a:prstGeom>
+        </p:spPr>
+      </p:pic>
+      <p:pic>
+        <p:nvPicPr>
+          <p:cNvPr id="8" name="Grafik 7">
+            <a:extLst>
+              <a:ext uri="{FF2B5EF4-FFF2-40B4-BE49-F238E27FC236}">
+                <a16:creationId xmlns:a16="http://schemas.microsoft.com/office/drawing/2014/main" id="{BB3872AE-DE72-43B1-B2C2-3238D186DC08}"/>
+              </a:ext>
+            </a:extLst>
+          </p:cNvPr>
+          <p:cNvPicPr>
+            <a:picLocks noChangeAspect="1"/>
+          </p:cNvPicPr>
+          <p:nvPr/>
+        </p:nvPicPr>
+        <p:blipFill>
+          <a:blip r:embed="rId3"/>
+          <a:stretch>
+            <a:fillRect/>
+          </a:stretch>
+        </p:blipFill>
+        <p:spPr>
+          <a:xfrm>
+            <a:off x="7441442" y="1085136"/>
+            <a:ext cx="4259189" cy="3179071"/>
+          </a:xfrm>
+          <a:prstGeom prst="rect">
+            <a:avLst/>
+          </a:prstGeom>
+        </p:spPr>
+      </p:pic>
+      <p:sp>
+        <p:nvSpPr>
+          <p:cNvPr id="9" name="Pfeil: nach rechts 8">
+            <a:extLst>
+              <a:ext uri="{FF2B5EF4-FFF2-40B4-BE49-F238E27FC236}">
+                <a16:creationId xmlns:a16="http://schemas.microsoft.com/office/drawing/2014/main" id="{A210769C-4BEC-4C3B-A9EB-35563F555AB4}"/>
+              </a:ext>
+            </a:extLst>
+          </p:cNvPr>
+          <p:cNvSpPr/>
+          <p:nvPr/>
+        </p:nvSpPr>
+        <p:spPr>
+          <a:xfrm>
+            <a:off x="9715311" y="2518505"/>
+            <a:ext cx="861390" cy="479622"/>
+          </a:xfrm>
+          <a:prstGeom prst="rightArrow">
+            <a:avLst/>
+          </a:prstGeom>
+        </p:spPr>
+        <p:style>
+          <a:lnRef idx="2">
+            <a:schemeClr val="accent2">
+              <a:shade val="50000"/>
+            </a:schemeClr>
+          </a:lnRef>
+          <a:fillRef idx="1">
+            <a:schemeClr val="accent2"/>
+          </a:fillRef>
+          <a:effectRef idx="0">
+            <a:schemeClr val="accent2"/>
+          </a:effectRef>
+          <a:fontRef idx="minor">
+            <a:schemeClr val="lt1"/>
+          </a:fontRef>
+        </p:style>
+        <p:txBody>
+          <a:bodyPr rtlCol="0" anchor="ctr"/>
+          <a:lstStyle/>
+          <a:p>
+            <a:pPr algn="ctr"/>
+            <a:endParaRPr lang="en-US" dirty="0"/>
+          </a:p>
+        </p:txBody>
+      </p:sp>
+      <p:sp>
+        <p:nvSpPr>
+          <p:cNvPr id="10" name="Textfeld 9">
+            <a:extLst>
+              <a:ext uri="{FF2B5EF4-FFF2-40B4-BE49-F238E27FC236}">
+                <a16:creationId xmlns:a16="http://schemas.microsoft.com/office/drawing/2014/main" id="{8A5B8A90-AFBD-4BFE-AC1D-0391CD0083BB}"/>
+              </a:ext>
+            </a:extLst>
+          </p:cNvPr>
+          <p:cNvSpPr txBox="1"/>
+          <p:nvPr/>
+        </p:nvSpPr>
+        <p:spPr>
+          <a:xfrm>
+            <a:off x="9697792" y="2573650"/>
+            <a:ext cx="861390" cy="369332"/>
+          </a:xfrm>
+          <a:prstGeom prst="rect">
+            <a:avLst/>
+          </a:prstGeom>
+          <a:noFill/>
+        </p:spPr>
+        <p:txBody>
+          <a:bodyPr wrap="square" rtlCol="0">
+            <a:spAutoFit/>
+          </a:bodyPr>
+          <a:lstStyle/>
+          <a:p>
+            <a:r>
+              <a:rPr lang="de-DE" dirty="0" err="1">
+                <a:solidFill>
+                  <a:schemeClr val="bg1"/>
+                </a:solidFill>
+              </a:rPr>
+              <a:t>close</a:t>
+            </a:r>
+            <a:endParaRPr lang="en-US" dirty="0">
+              <a:solidFill>
+                <a:schemeClr val="bg1"/>
+              </a:solidFill>
+            </a:endParaRPr>
+          </a:p>
+        </p:txBody>
+      </p:sp>
+      <p:sp>
+        <p:nvSpPr>
+          <p:cNvPr id="11" name="Pfeil: nach rechts 10">
+            <a:extLst>
+              <a:ext uri="{FF2B5EF4-FFF2-40B4-BE49-F238E27FC236}">
+                <a16:creationId xmlns:a16="http://schemas.microsoft.com/office/drawing/2014/main" id="{5765D245-578E-4C5B-82EF-CB6687F2A6EB}"/>
+              </a:ext>
+            </a:extLst>
+          </p:cNvPr>
+          <p:cNvSpPr/>
+          <p:nvPr/>
+        </p:nvSpPr>
+        <p:spPr>
+          <a:xfrm rot="10800000">
+            <a:off x="8870505" y="2920203"/>
+            <a:ext cx="861390" cy="479622"/>
+          </a:xfrm>
+          <a:prstGeom prst="rightArrow">
+            <a:avLst/>
+          </a:prstGeom>
+        </p:spPr>
+        <p:style>
+          <a:lnRef idx="2">
+            <a:schemeClr val="accent2">
+              <a:shade val="50000"/>
+            </a:schemeClr>
+          </a:lnRef>
+          <a:fillRef idx="1">
+            <a:schemeClr val="accent2"/>
+          </a:fillRef>
+          <a:effectRef idx="0">
+            <a:schemeClr val="accent2"/>
+          </a:effectRef>
+          <a:fontRef idx="minor">
+            <a:schemeClr val="lt1"/>
+          </a:fontRef>
+        </p:style>
+        <p:txBody>
+          <a:bodyPr rtlCol="0" anchor="ctr"/>
+          <a:lstStyle/>
+          <a:p>
+            <a:pPr algn="ctr"/>
+            <a:endParaRPr lang="en-US" dirty="0"/>
+          </a:p>
+        </p:txBody>
+      </p:sp>
+      <p:sp>
+        <p:nvSpPr>
+          <p:cNvPr id="12" name="Textfeld 11">
+            <a:extLst>
+              <a:ext uri="{FF2B5EF4-FFF2-40B4-BE49-F238E27FC236}">
+                <a16:creationId xmlns:a16="http://schemas.microsoft.com/office/drawing/2014/main" id="{9D184A3E-E516-41AF-A019-19F4E2344C48}"/>
+              </a:ext>
+            </a:extLst>
+          </p:cNvPr>
+          <p:cNvSpPr txBox="1"/>
+          <p:nvPr/>
+        </p:nvSpPr>
+        <p:spPr>
+          <a:xfrm>
+            <a:off x="8989774" y="2942982"/>
+            <a:ext cx="861390" cy="369332"/>
+          </a:xfrm>
+          <a:prstGeom prst="rect">
+            <a:avLst/>
+          </a:prstGeom>
+          <a:noFill/>
+        </p:spPr>
+        <p:txBody>
+          <a:bodyPr wrap="square" rtlCol="0">
+            <a:spAutoFit/>
+          </a:bodyPr>
+          <a:lstStyle/>
+          <a:p>
+            <a:r>
+              <a:rPr lang="de-DE" dirty="0">
+                <a:solidFill>
+                  <a:schemeClr val="bg1"/>
+                </a:solidFill>
+              </a:rPr>
+              <a:t>open</a:t>
+            </a:r>
+            <a:endParaRPr lang="en-US" dirty="0">
+              <a:solidFill>
+                <a:schemeClr val="bg1"/>
+              </a:solidFill>
+            </a:endParaRPr>
+          </a:p>
+        </p:txBody>
+      </p:sp>
+      <p:cxnSp>
+        <p:nvCxnSpPr>
+          <p:cNvPr id="21" name="Verbinder: gewinkelt 20">
+            <a:extLst>
+              <a:ext uri="{FF2B5EF4-FFF2-40B4-BE49-F238E27FC236}">
+                <a16:creationId xmlns:a16="http://schemas.microsoft.com/office/drawing/2014/main" id="{C90EB3B5-D670-4B82-808A-55BD5DFEBC7A}"/>
+              </a:ext>
+            </a:extLst>
+          </p:cNvPr>
+          <p:cNvCxnSpPr>
+            <a:stCxn id="7" idx="0"/>
+          </p:cNvCxnSpPr>
+          <p:nvPr/>
+        </p:nvCxnSpPr>
+        <p:spPr>
+          <a:xfrm rot="5400000" flipH="1" flipV="1">
+            <a:off x="6196711" y="1832556"/>
+            <a:ext cx="1200253" cy="1345442"/>
+          </a:xfrm>
+          <a:prstGeom prst="bentConnector2">
+            <a:avLst/>
+          </a:prstGeom>
+          <a:ln>
+            <a:tailEnd type="triangle"/>
+          </a:ln>
+        </p:spPr>
+        <p:style>
+          <a:lnRef idx="1">
+            <a:schemeClr val="accent1"/>
+          </a:lnRef>
+          <a:fillRef idx="0">
+            <a:schemeClr val="accent1"/>
+          </a:fillRef>
+          <a:effectRef idx="0">
+            <a:schemeClr val="accent1"/>
+          </a:effectRef>
+          <a:fontRef idx="minor">
+            <a:schemeClr val="tx1"/>
+          </a:fontRef>
+        </p:style>
+      </p:cxnSp>
+      <p:sp>
+        <p:nvSpPr>
+          <p:cNvPr id="22" name="Textfeld 21">
+            <a:extLst>
+              <a:ext uri="{FF2B5EF4-FFF2-40B4-BE49-F238E27FC236}">
+                <a16:creationId xmlns:a16="http://schemas.microsoft.com/office/drawing/2014/main" id="{5D5F4D9E-0007-41EC-82D7-043E54987B48}"/>
+              </a:ext>
+            </a:extLst>
+          </p:cNvPr>
+          <p:cNvSpPr txBox="1"/>
+          <p:nvPr/>
+        </p:nvSpPr>
+        <p:spPr>
+          <a:xfrm>
+            <a:off x="2729491" y="3344546"/>
+            <a:ext cx="2251257" cy="369332"/>
+          </a:xfrm>
+          <a:prstGeom prst="rect">
+            <a:avLst/>
+          </a:prstGeom>
+          <a:noFill/>
+        </p:spPr>
+        <p:txBody>
+          <a:bodyPr wrap="none" rtlCol="0">
+            <a:spAutoFit/>
+          </a:bodyPr>
+          <a:lstStyle/>
+          <a:p>
+            <a:r>
+              <a:rPr lang="de-DE" dirty="0" err="1"/>
+              <a:t>touched</a:t>
+            </a:r>
+            <a:r>
+              <a:rPr lang="de-DE" dirty="0"/>
+              <a:t>/ not </a:t>
+            </a:r>
+            <a:r>
+              <a:rPr lang="de-DE" dirty="0" err="1"/>
+              <a:t>touched</a:t>
+            </a:r>
+            <a:endParaRPr lang="de-DE" dirty="0"/>
+          </a:p>
+        </p:txBody>
+      </p:sp>
+      <p:cxnSp>
+        <p:nvCxnSpPr>
+          <p:cNvPr id="24" name="Verbinder: gewinkelt 23">
+            <a:extLst>
+              <a:ext uri="{FF2B5EF4-FFF2-40B4-BE49-F238E27FC236}">
+                <a16:creationId xmlns:a16="http://schemas.microsoft.com/office/drawing/2014/main" id="{20E54040-1FF1-4ECE-924F-372E06C81C16}"/>
+              </a:ext>
+            </a:extLst>
+          </p:cNvPr>
+          <p:cNvCxnSpPr>
+            <a:stCxn id="8" idx="1"/>
+            <a:endCxn id="7" idx="3"/>
+          </p:cNvCxnSpPr>
+          <p:nvPr/>
+        </p:nvCxnSpPr>
+        <p:spPr>
+          <a:xfrm rot="10800000" flipV="1">
+            <a:off x="6624752" y="2674672"/>
+            <a:ext cx="816690" cy="1059278"/>
+          </a:xfrm>
+          <a:prstGeom prst="bentConnector3">
+            <a:avLst/>
+          </a:prstGeom>
+          <a:ln>
+            <a:tailEnd type="triangle"/>
+          </a:ln>
+        </p:spPr>
+        <p:style>
+          <a:lnRef idx="1">
+            <a:schemeClr val="accent1"/>
+          </a:lnRef>
+          <a:fillRef idx="0">
+            <a:schemeClr val="accent1"/>
+          </a:fillRef>
+          <a:effectRef idx="0">
+            <a:schemeClr val="accent1"/>
+          </a:effectRef>
+          <a:fontRef idx="minor">
+            <a:schemeClr val="tx1"/>
+          </a:fontRef>
+        </p:style>
+      </p:cxnSp>
+      <p:sp>
+        <p:nvSpPr>
+          <p:cNvPr id="25" name="Textfeld 24">
+            <a:extLst>
+              <a:ext uri="{FF2B5EF4-FFF2-40B4-BE49-F238E27FC236}">
+                <a16:creationId xmlns:a16="http://schemas.microsoft.com/office/drawing/2014/main" id="{53B211FD-176F-442A-A673-5B8905874474}"/>
+              </a:ext>
+            </a:extLst>
+          </p:cNvPr>
+          <p:cNvSpPr txBox="1"/>
+          <p:nvPr/>
+        </p:nvSpPr>
+        <p:spPr>
+          <a:xfrm>
+            <a:off x="6589274" y="3668704"/>
+            <a:ext cx="859531" cy="369332"/>
+          </a:xfrm>
+          <a:prstGeom prst="rect">
+            <a:avLst/>
+          </a:prstGeom>
+          <a:noFill/>
+        </p:spPr>
+        <p:txBody>
+          <a:bodyPr wrap="none" rtlCol="0">
+            <a:spAutoFit/>
+          </a:bodyPr>
+          <a:lstStyle/>
+          <a:p>
+            <a:r>
+              <a:rPr lang="de-DE" dirty="0" err="1"/>
+              <a:t>closed</a:t>
+            </a:r>
+            <a:r>
+              <a:rPr lang="de-DE" dirty="0"/>
+              <a:t>!</a:t>
+            </a:r>
+          </a:p>
+        </p:txBody>
+      </p:sp>
+      <p:cxnSp>
+        <p:nvCxnSpPr>
+          <p:cNvPr id="27" name="Verbinder: gewinkelt 26">
+            <a:extLst>
+              <a:ext uri="{FF2B5EF4-FFF2-40B4-BE49-F238E27FC236}">
+                <a16:creationId xmlns:a16="http://schemas.microsoft.com/office/drawing/2014/main" id="{D36C836D-D2FC-472D-B36C-CCE8CEB79293}"/>
+              </a:ext>
+            </a:extLst>
+          </p:cNvPr>
+          <p:cNvCxnSpPr>
+            <a:cxnSpLocks/>
+            <a:stCxn id="4" idx="0"/>
+            <a:endCxn id="7" idx="1"/>
+          </p:cNvCxnSpPr>
+          <p:nvPr/>
+        </p:nvCxnSpPr>
+        <p:spPr>
+          <a:xfrm rot="5400000" flipH="1" flipV="1">
+            <a:off x="3101890" y="2607003"/>
+            <a:ext cx="1394641" cy="3648537"/>
+          </a:xfrm>
+          <a:prstGeom prst="bentConnector2">
+            <a:avLst/>
+          </a:prstGeom>
+          <a:ln>
+            <a:tailEnd type="triangle"/>
+          </a:ln>
+        </p:spPr>
+        <p:style>
+          <a:lnRef idx="1">
+            <a:schemeClr val="accent1"/>
+          </a:lnRef>
+          <a:fillRef idx="0">
+            <a:schemeClr val="accent1"/>
+          </a:fillRef>
+          <a:effectRef idx="0">
+            <a:schemeClr val="accent1"/>
+          </a:effectRef>
+          <a:fontRef idx="minor">
+            <a:schemeClr val="tx1"/>
+          </a:fontRef>
+        </p:style>
+      </p:cxnSp>
+      <p:cxnSp>
+        <p:nvCxnSpPr>
+          <p:cNvPr id="30" name="Verbinder: gewinkelt 29">
+            <a:extLst>
+              <a:ext uri="{FF2B5EF4-FFF2-40B4-BE49-F238E27FC236}">
+                <a16:creationId xmlns:a16="http://schemas.microsoft.com/office/drawing/2014/main" id="{612F4815-DA46-4372-9B14-0D9C28F04911}"/>
+              </a:ext>
+            </a:extLst>
+          </p:cNvPr>
+          <p:cNvCxnSpPr>
+            <a:stCxn id="5" idx="0"/>
+            <a:endCxn id="7" idx="2"/>
+          </p:cNvCxnSpPr>
+          <p:nvPr/>
+        </p:nvCxnSpPr>
+        <p:spPr>
+          <a:xfrm rot="5400000" flipH="1" flipV="1">
+            <a:off x="5731031" y="4755580"/>
+            <a:ext cx="786168" cy="1"/>
+          </a:xfrm>
+          <a:prstGeom prst="bentConnector3">
+            <a:avLst/>
+          </a:prstGeom>
+          <a:ln>
+            <a:tailEnd type="triangle"/>
+          </a:ln>
+        </p:spPr>
+        <p:style>
+          <a:lnRef idx="1">
+            <a:schemeClr val="accent1"/>
+          </a:lnRef>
+          <a:fillRef idx="0">
+            <a:schemeClr val="accent1"/>
+          </a:fillRef>
+          <a:effectRef idx="0">
+            <a:schemeClr val="accent1"/>
+          </a:effectRef>
+          <a:fontRef idx="minor">
+            <a:schemeClr val="tx1"/>
+          </a:fontRef>
+        </p:style>
+      </p:cxnSp>
+      <p:cxnSp>
+        <p:nvCxnSpPr>
+          <p:cNvPr id="37" name="Verbinder: gewinkelt 36">
+            <a:extLst>
+              <a:ext uri="{FF2B5EF4-FFF2-40B4-BE49-F238E27FC236}">
+                <a16:creationId xmlns:a16="http://schemas.microsoft.com/office/drawing/2014/main" id="{3EA26604-DD90-4846-92D3-C4F92FCE917A}"/>
+              </a:ext>
+            </a:extLst>
+          </p:cNvPr>
+          <p:cNvCxnSpPr>
+            <a:cxnSpLocks/>
+            <a:stCxn id="6" idx="1"/>
+          </p:cNvCxnSpPr>
+          <p:nvPr/>
+        </p:nvCxnSpPr>
+        <p:spPr>
+          <a:xfrm rot="10800000">
+            <a:off x="6624752" y="4362496"/>
+            <a:ext cx="3091671" cy="1394640"/>
+          </a:xfrm>
+          <a:prstGeom prst="bentConnector3">
+            <a:avLst/>
+          </a:prstGeom>
+          <a:ln>
+            <a:tailEnd type="triangle"/>
+          </a:ln>
+        </p:spPr>
+        <p:style>
+          <a:lnRef idx="1">
+            <a:schemeClr val="accent1"/>
+          </a:lnRef>
+          <a:fillRef idx="0">
+            <a:schemeClr val="accent1"/>
+          </a:fillRef>
+          <a:effectRef idx="0">
+            <a:schemeClr val="accent1"/>
+          </a:effectRef>
+          <a:fontRef idx="minor">
+            <a:schemeClr val="tx1"/>
+          </a:fontRef>
+        </p:style>
+      </p:cxnSp>
+      <p:sp>
+        <p:nvSpPr>
+          <p:cNvPr id="39" name="Textfeld 38">
+            <a:extLst>
+              <a:ext uri="{FF2B5EF4-FFF2-40B4-BE49-F238E27FC236}">
+                <a16:creationId xmlns:a16="http://schemas.microsoft.com/office/drawing/2014/main" id="{B5DF4F72-C07C-4257-8236-3C9035E62947}"/>
+              </a:ext>
+            </a:extLst>
+          </p:cNvPr>
+          <p:cNvSpPr txBox="1"/>
+          <p:nvPr/>
+        </p:nvSpPr>
+        <p:spPr>
+          <a:xfrm>
+            <a:off x="6096000" y="1580690"/>
+            <a:ext cx="1228863" cy="369332"/>
+          </a:xfrm>
+          <a:prstGeom prst="rect">
+            <a:avLst/>
+          </a:prstGeom>
+          <a:noFill/>
+        </p:spPr>
+        <p:txBody>
+          <a:bodyPr wrap="none" rtlCol="0">
+            <a:spAutoFit/>
+          </a:bodyPr>
+          <a:lstStyle/>
+          <a:p>
+            <a:r>
+              <a:rPr lang="de-DE" dirty="0"/>
+              <a:t>open/</a:t>
+            </a:r>
+            <a:r>
+              <a:rPr lang="de-DE" dirty="0" err="1"/>
+              <a:t>close</a:t>
+            </a:r>
+            <a:endParaRPr lang="de-DE" dirty="0"/>
+          </a:p>
+        </p:txBody>
+      </p:sp>
+      <p:sp>
+        <p:nvSpPr>
+          <p:cNvPr id="40" name="Textfeld 39">
+            <a:extLst>
+              <a:ext uri="{FF2B5EF4-FFF2-40B4-BE49-F238E27FC236}">
+                <a16:creationId xmlns:a16="http://schemas.microsoft.com/office/drawing/2014/main" id="{943F1900-B1B9-4512-9D2E-7D57CA9F27D8}"/>
+              </a:ext>
+            </a:extLst>
+          </p:cNvPr>
+          <p:cNvSpPr txBox="1"/>
+          <p:nvPr/>
+        </p:nvSpPr>
+        <p:spPr>
+          <a:xfrm>
+            <a:off x="3872857" y="4690484"/>
+            <a:ext cx="2251257" cy="369332"/>
+          </a:xfrm>
+          <a:prstGeom prst="rect">
+            <a:avLst/>
+          </a:prstGeom>
+          <a:noFill/>
+        </p:spPr>
+        <p:txBody>
+          <a:bodyPr wrap="none" rtlCol="0">
+            <a:spAutoFit/>
+          </a:bodyPr>
+          <a:lstStyle/>
+          <a:p>
+            <a:r>
+              <a:rPr lang="de-DE" dirty="0" err="1"/>
+              <a:t>touched</a:t>
+            </a:r>
+            <a:r>
+              <a:rPr lang="de-DE" dirty="0"/>
+              <a:t>/ not </a:t>
+            </a:r>
+            <a:r>
+              <a:rPr lang="de-DE" dirty="0" err="1"/>
+              <a:t>touched</a:t>
+            </a:r>
+            <a:endParaRPr lang="de-DE" dirty="0"/>
+          </a:p>
+        </p:txBody>
+      </p:sp>
+      <p:sp>
+        <p:nvSpPr>
+          <p:cNvPr id="41" name="Textfeld 40">
+            <a:extLst>
+              <a:ext uri="{FF2B5EF4-FFF2-40B4-BE49-F238E27FC236}">
+                <a16:creationId xmlns:a16="http://schemas.microsoft.com/office/drawing/2014/main" id="{071BA72F-6C07-41F3-8105-1C9B8C674FBB}"/>
+              </a:ext>
+            </a:extLst>
+          </p:cNvPr>
+          <p:cNvSpPr txBox="1"/>
+          <p:nvPr/>
+        </p:nvSpPr>
+        <p:spPr>
+          <a:xfrm>
+            <a:off x="7599907" y="5767895"/>
+            <a:ext cx="2251257" cy="369332"/>
+          </a:xfrm>
+          <a:prstGeom prst="rect">
+            <a:avLst/>
+          </a:prstGeom>
+          <a:noFill/>
+        </p:spPr>
+        <p:txBody>
+          <a:bodyPr wrap="none" rtlCol="0">
+            <a:spAutoFit/>
+          </a:bodyPr>
+          <a:lstStyle/>
+          <a:p>
+            <a:r>
+              <a:rPr lang="de-DE" dirty="0" err="1"/>
+              <a:t>touched</a:t>
+            </a:r>
+            <a:r>
+              <a:rPr lang="de-DE" dirty="0"/>
+              <a:t>/ not </a:t>
+            </a:r>
+            <a:r>
+              <a:rPr lang="de-DE" dirty="0" err="1"/>
+              <a:t>touched</a:t>
+            </a:r>
+            <a:endParaRPr lang="de-DE" dirty="0"/>
+          </a:p>
+        </p:txBody>
+      </p:sp>
+      <p:sp>
+        <p:nvSpPr>
+          <p:cNvPr id="42" name="Textfeld 41">
+            <a:extLst>
+              <a:ext uri="{FF2B5EF4-FFF2-40B4-BE49-F238E27FC236}">
+                <a16:creationId xmlns:a16="http://schemas.microsoft.com/office/drawing/2014/main" id="{43B8DA10-BE97-449A-AF92-857E8DBEDB57}"/>
+              </a:ext>
+            </a:extLst>
+          </p:cNvPr>
+          <p:cNvSpPr txBox="1"/>
+          <p:nvPr/>
+        </p:nvSpPr>
+        <p:spPr>
+          <a:xfrm>
+            <a:off x="4717872" y="3942538"/>
+            <a:ext cx="1054712" cy="461665"/>
+          </a:xfrm>
+          <a:prstGeom prst="rect">
+            <a:avLst/>
+          </a:prstGeom>
+          <a:noFill/>
+        </p:spPr>
+        <p:txBody>
+          <a:bodyPr wrap="none" rtlCol="0">
+            <a:spAutoFit/>
+          </a:bodyPr>
+          <a:lstStyle/>
+          <a:p>
+            <a:r>
+              <a:rPr lang="de-DE" sz="2400" dirty="0" err="1">
+                <a:solidFill>
+                  <a:schemeClr val="accent2"/>
+                </a:solidFill>
+              </a:rPr>
+              <a:t>master</a:t>
+            </a:r>
+            <a:endParaRPr lang="de-DE" sz="2400" dirty="0">
+              <a:solidFill>
+                <a:schemeClr val="accent2"/>
+              </a:solidFill>
+            </a:endParaRPr>
+          </a:p>
+        </p:txBody>
+      </p:sp>
+      <p:sp>
+        <p:nvSpPr>
+          <p:cNvPr id="43" name="Textfeld 42">
+            <a:extLst>
+              <a:ext uri="{FF2B5EF4-FFF2-40B4-BE49-F238E27FC236}">
+                <a16:creationId xmlns:a16="http://schemas.microsoft.com/office/drawing/2014/main" id="{27B29D64-BC8A-40DF-8342-C681586BC3B6}"/>
+              </a:ext>
+            </a:extLst>
+          </p:cNvPr>
+          <p:cNvSpPr txBox="1"/>
+          <p:nvPr/>
+        </p:nvSpPr>
+        <p:spPr>
+          <a:xfrm>
+            <a:off x="1570888" y="6385682"/>
+            <a:ext cx="808106" cy="461665"/>
+          </a:xfrm>
+          <a:prstGeom prst="rect">
+            <a:avLst/>
+          </a:prstGeom>
+          <a:noFill/>
+        </p:spPr>
+        <p:txBody>
+          <a:bodyPr wrap="none" rtlCol="0">
+            <a:spAutoFit/>
+          </a:bodyPr>
+          <a:lstStyle/>
+          <a:p>
+            <a:r>
+              <a:rPr lang="de-DE" sz="2400" dirty="0" err="1">
+                <a:solidFill>
+                  <a:schemeClr val="accent2"/>
+                </a:solidFill>
+              </a:rPr>
+              <a:t>slave</a:t>
+            </a:r>
+            <a:endParaRPr lang="de-DE" sz="2400" dirty="0">
+              <a:solidFill>
+                <a:schemeClr val="accent2"/>
+              </a:solidFill>
+            </a:endParaRPr>
+          </a:p>
+        </p:txBody>
+      </p:sp>
+      <p:sp>
+        <p:nvSpPr>
+          <p:cNvPr id="44" name="Textfeld 43">
+            <a:extLst>
+              <a:ext uri="{FF2B5EF4-FFF2-40B4-BE49-F238E27FC236}">
+                <a16:creationId xmlns:a16="http://schemas.microsoft.com/office/drawing/2014/main" id="{51C74CAA-CA2C-467E-92FC-E38B0FB8A0E0}"/>
+              </a:ext>
+            </a:extLst>
+          </p:cNvPr>
+          <p:cNvSpPr txBox="1"/>
+          <p:nvPr/>
+        </p:nvSpPr>
+        <p:spPr>
+          <a:xfrm>
+            <a:off x="5772584" y="6389019"/>
+            <a:ext cx="808106" cy="461665"/>
+          </a:xfrm>
+          <a:prstGeom prst="rect">
+            <a:avLst/>
+          </a:prstGeom>
+          <a:noFill/>
+        </p:spPr>
+        <p:txBody>
+          <a:bodyPr wrap="none" rtlCol="0">
+            <a:spAutoFit/>
+          </a:bodyPr>
+          <a:lstStyle/>
+          <a:p>
+            <a:r>
+              <a:rPr lang="de-DE" sz="2400" dirty="0" err="1">
+                <a:solidFill>
+                  <a:schemeClr val="accent2"/>
+                </a:solidFill>
+              </a:rPr>
+              <a:t>slave</a:t>
+            </a:r>
+            <a:endParaRPr lang="de-DE" sz="2400" dirty="0">
+              <a:solidFill>
+                <a:schemeClr val="accent2"/>
+              </a:solidFill>
+            </a:endParaRPr>
+          </a:p>
+        </p:txBody>
+      </p:sp>
+      <p:sp>
+        <p:nvSpPr>
+          <p:cNvPr id="45" name="Textfeld 44">
+            <a:extLst>
+              <a:ext uri="{FF2B5EF4-FFF2-40B4-BE49-F238E27FC236}">
+                <a16:creationId xmlns:a16="http://schemas.microsoft.com/office/drawing/2014/main" id="{BB79FED0-1073-4336-BBD9-9C160AC51219}"/>
+              </a:ext>
+            </a:extLst>
+          </p:cNvPr>
+          <p:cNvSpPr txBox="1"/>
+          <p:nvPr/>
+        </p:nvSpPr>
+        <p:spPr>
+          <a:xfrm>
+            <a:off x="9834828" y="6378366"/>
+            <a:ext cx="808106" cy="461665"/>
+          </a:xfrm>
+          <a:prstGeom prst="rect">
+            <a:avLst/>
+          </a:prstGeom>
+          <a:noFill/>
+        </p:spPr>
+        <p:txBody>
+          <a:bodyPr wrap="none" rtlCol="0">
+            <a:spAutoFit/>
+          </a:bodyPr>
+          <a:lstStyle/>
+          <a:p>
+            <a:r>
+              <a:rPr lang="de-DE" sz="2400" dirty="0" err="1">
+                <a:solidFill>
+                  <a:schemeClr val="accent2"/>
+                </a:solidFill>
+              </a:rPr>
+              <a:t>slave</a:t>
+            </a:r>
+            <a:endParaRPr lang="de-DE" sz="2400" dirty="0">
+              <a:solidFill>
+                <a:schemeClr val="accent2"/>
+              </a:solidFill>
+            </a:endParaRPr>
+          </a:p>
+        </p:txBody>
+      </p:sp>
+    </p:spTree>
+    <p:extLst>
+      <p:ext uri="{BB962C8B-B14F-4D97-AF65-F5344CB8AC3E}">
+        <p14:creationId xmlns:p14="http://schemas.microsoft.com/office/powerpoint/2010/main" val="3549666561"/>
       </p:ext>
     </p:extLst>
   </p:cSld>
@@ -3934,7 +5102,12 @@
             <p:ph type="title"/>
           </p:nvPr>
         </p:nvSpPr>
-        <p:spPr/>
+        <p:spPr>
+          <a:xfrm>
+            <a:off x="838200" y="365125"/>
+            <a:ext cx="10515600" cy="1325563"/>
+          </a:xfrm>
+        </p:spPr>
         <p:txBody>
           <a:bodyPr/>
           <a:lstStyle/>
@@ -4262,7 +5435,7 @@
         </p:blipFill>
         <p:spPr bwMode="auto">
           <a:xfrm>
-            <a:off x="4022648" y="2064139"/>
+            <a:off x="4952318" y="3103737"/>
             <a:ext cx="1815446" cy="1325564"/>
           </a:xfrm>
           <a:prstGeom prst="rect">
@@ -4294,7 +5467,7 @@
         </p:nvSpPr>
         <p:spPr>
           <a:xfrm>
-            <a:off x="4520419" y="3392140"/>
+            <a:off x="5444758" y="4442699"/>
             <a:ext cx="1575581" cy="369332"/>
           </a:xfrm>
           <a:prstGeom prst="rect">
@@ -4338,7 +5511,7 @@
         </p:blipFill>
         <p:spPr>
           <a:xfrm>
-            <a:off x="1483106" y="4425702"/>
+            <a:off x="1286882" y="4425702"/>
             <a:ext cx="1775935" cy="1325563"/>
           </a:xfrm>
           <a:prstGeom prst="rect">
@@ -4368,7 +5541,7 @@
         </p:blipFill>
         <p:spPr>
           <a:xfrm>
-            <a:off x="7852856" y="1690688"/>
+            <a:off x="8330138" y="2011104"/>
             <a:ext cx="1775935" cy="1325563"/>
           </a:xfrm>
           <a:prstGeom prst="rect">
@@ -4390,7 +5563,7 @@
         </p:nvSpPr>
         <p:spPr>
           <a:xfrm>
-            <a:off x="1831528" y="5938877"/>
+            <a:off x="1635304" y="5938877"/>
             <a:ext cx="1319839" cy="369332"/>
           </a:xfrm>
           <a:prstGeom prst="rect">
@@ -4426,7 +5599,7 @@
         </p:nvSpPr>
         <p:spPr>
           <a:xfrm>
-            <a:off x="8308950" y="3059668"/>
+            <a:off x="8786232" y="3380084"/>
             <a:ext cx="1319839" cy="369332"/>
           </a:xfrm>
           <a:prstGeom prst="rect">
@@ -4470,8 +5643,8 @@
         </p:blipFill>
         <p:spPr>
           <a:xfrm>
-            <a:off x="3958616" y="5240366"/>
-            <a:ext cx="767416" cy="963486"/>
+            <a:off x="8663526" y="4425702"/>
+            <a:ext cx="1085059" cy="1362285"/>
           </a:xfrm>
           <a:prstGeom prst="rect">
             <a:avLst/>
@@ -4492,7 +5665,7 @@
         </p:nvSpPr>
         <p:spPr>
           <a:xfrm>
-            <a:off x="3913616" y="6308209"/>
+            <a:off x="8891169" y="5754211"/>
             <a:ext cx="857416" cy="369332"/>
           </a:xfrm>
           <a:prstGeom prst="rect">
@@ -4544,6 +5717,175 @@
           </a:prstGeom>
         </p:spPr>
       </p:pic>
+      <p:cxnSp>
+        <p:nvCxnSpPr>
+          <p:cNvPr id="18" name="Verbinder: gewinkelt 17">
+            <a:extLst>
+              <a:ext uri="{FF2B5EF4-FFF2-40B4-BE49-F238E27FC236}">
+                <a16:creationId xmlns:a16="http://schemas.microsoft.com/office/drawing/2014/main" id="{836A8F34-B7A8-4D8C-A472-CBCB4C038ED0}"/>
+              </a:ext>
+            </a:extLst>
+          </p:cNvPr>
+          <p:cNvCxnSpPr>
+            <a:endCxn id="7" idx="1"/>
+          </p:cNvCxnSpPr>
+          <p:nvPr/>
+        </p:nvCxnSpPr>
+        <p:spPr>
+          <a:xfrm flipV="1">
+            <a:off x="6767764" y="2673886"/>
+            <a:ext cx="1562374" cy="662781"/>
+          </a:xfrm>
+          <a:prstGeom prst="bentConnector3">
+            <a:avLst/>
+          </a:prstGeom>
+          <a:ln>
+            <a:headEnd type="triangle"/>
+            <a:tailEnd type="triangle"/>
+          </a:ln>
+        </p:spPr>
+        <p:style>
+          <a:lnRef idx="1">
+            <a:schemeClr val="accent1"/>
+          </a:lnRef>
+          <a:fillRef idx="0">
+            <a:schemeClr val="accent1"/>
+          </a:fillRef>
+          <a:effectRef idx="0">
+            <a:schemeClr val="accent1"/>
+          </a:effectRef>
+          <a:fontRef idx="minor">
+            <a:schemeClr val="tx1"/>
+          </a:fontRef>
+        </p:style>
+      </p:cxnSp>
+      <p:cxnSp>
+        <p:nvCxnSpPr>
+          <p:cNvPr id="20" name="Verbinder: gewinkelt 19">
+            <a:extLst>
+              <a:ext uri="{FF2B5EF4-FFF2-40B4-BE49-F238E27FC236}">
+                <a16:creationId xmlns:a16="http://schemas.microsoft.com/office/drawing/2014/main" id="{10C36531-EA8C-47C9-934F-6B7DC7FF53F0}"/>
+              </a:ext>
+            </a:extLst>
+          </p:cNvPr>
+          <p:cNvCxnSpPr>
+            <a:endCxn id="12" idx="3"/>
+          </p:cNvCxnSpPr>
+          <p:nvPr/>
+        </p:nvCxnSpPr>
+        <p:spPr>
+          <a:xfrm rot="10800000">
+            <a:off x="2371074" y="2673887"/>
+            <a:ext cx="2479222" cy="662781"/>
+          </a:xfrm>
+          <a:prstGeom prst="bentConnector3">
+            <a:avLst/>
+          </a:prstGeom>
+          <a:ln>
+            <a:headEnd type="triangle"/>
+            <a:tailEnd type="triangle"/>
+          </a:ln>
+        </p:spPr>
+        <p:style>
+          <a:lnRef idx="1">
+            <a:schemeClr val="accent1"/>
+          </a:lnRef>
+          <a:fillRef idx="0">
+            <a:schemeClr val="accent1"/>
+          </a:fillRef>
+          <a:effectRef idx="0">
+            <a:schemeClr val="accent1"/>
+          </a:effectRef>
+          <a:fontRef idx="minor">
+            <a:schemeClr val="tx1"/>
+          </a:fontRef>
+        </p:style>
+      </p:cxnSp>
+      <p:cxnSp>
+        <p:nvCxnSpPr>
+          <p:cNvPr id="22" name="Verbinder: gewinkelt 21">
+            <a:extLst>
+              <a:ext uri="{FF2B5EF4-FFF2-40B4-BE49-F238E27FC236}">
+                <a16:creationId xmlns:a16="http://schemas.microsoft.com/office/drawing/2014/main" id="{8CA1A671-E6F3-4A34-9B72-58595FEAFD1B}"/>
+              </a:ext>
+            </a:extLst>
+          </p:cNvPr>
+          <p:cNvCxnSpPr>
+            <a:stCxn id="6" idx="3"/>
+          </p:cNvCxnSpPr>
+          <p:nvPr/>
+        </p:nvCxnSpPr>
+        <p:spPr>
+          <a:xfrm flipV="1">
+            <a:off x="3062817" y="4114800"/>
+            <a:ext cx="1889501" cy="973684"/>
+          </a:xfrm>
+          <a:prstGeom prst="bentConnector3">
+            <a:avLst/>
+          </a:prstGeom>
+          <a:ln>
+            <a:headEnd type="triangle"/>
+            <a:tailEnd type="triangle"/>
+          </a:ln>
+        </p:spPr>
+        <p:style>
+          <a:lnRef idx="1">
+            <a:schemeClr val="accent1"/>
+          </a:lnRef>
+          <a:fillRef idx="0">
+            <a:schemeClr val="accent1"/>
+          </a:fillRef>
+          <a:effectRef idx="0">
+            <a:schemeClr val="accent1"/>
+          </a:effectRef>
+          <a:fontRef idx="minor">
+            <a:schemeClr val="tx1"/>
+          </a:fontRef>
+        </p:style>
+      </p:cxnSp>
+      <p:cxnSp>
+        <p:nvCxnSpPr>
+          <p:cNvPr id="24" name="Verbinder: gewinkelt 23">
+            <a:extLst>
+              <a:ext uri="{FF2B5EF4-FFF2-40B4-BE49-F238E27FC236}">
+                <a16:creationId xmlns:a16="http://schemas.microsoft.com/office/drawing/2014/main" id="{82B9BA8D-14E7-4F3E-A947-91170DDF2F24}"/>
+              </a:ext>
+            </a:extLst>
+          </p:cNvPr>
+          <p:cNvCxnSpPr>
+            <a:cxnSpLocks/>
+            <a:stCxn id="10" idx="1"/>
+          </p:cNvCxnSpPr>
+          <p:nvPr/>
+        </p:nvCxnSpPr>
+        <p:spPr>
+          <a:xfrm rot="10800000">
+            <a:off x="6767764" y="4012953"/>
+            <a:ext cx="1895762" cy="1093892"/>
+          </a:xfrm>
+          <a:prstGeom prst="bentConnector3">
+            <a:avLst/>
+          </a:prstGeom>
+          <a:ln>
+            <a:headEnd type="triangle"/>
+            <a:tailEnd type="triangle"/>
+          </a:ln>
+        </p:spPr>
+        <p:style>
+          <a:lnRef idx="1">
+            <a:schemeClr val="accent1"/>
+          </a:lnRef>
+          <a:fillRef idx="0">
+            <a:schemeClr val="accent1"/>
+          </a:fillRef>
+          <a:effectRef idx="0">
+            <a:schemeClr val="accent1"/>
+          </a:effectRef>
+          <a:fontRef idx="minor">
+            <a:schemeClr val="tx1"/>
+          </a:fontRef>
+        </p:style>
+      </p:cxnSp>
     </p:spTree>
     <p:extLst>
       <p:ext uri="{BB962C8B-B14F-4D97-AF65-F5344CB8AC3E}">

</xml_diff>